<commit_message>
Split 3D Rotation into components, implement specific testcases
</commit_message>
<xml_diff>
--- a/doc/test/SyncLab/SyncLab_ThreeDRotationEffect.pptx
+++ b/doc/test/SyncLab/SyncLab_ThreeDRotationEffect.pptx
@@ -7,6 +7,11 @@
   <p:sldIdLst>
     <p:sldId id="256" r:id="rId2"/>
     <p:sldId id="257" r:id="rId3"/>
+    <p:sldId id="258" r:id="rId4"/>
+    <p:sldId id="259" r:id="rId5"/>
+    <p:sldId id="260" r:id="rId6"/>
+    <p:sldId id="261" r:id="rId7"/>
+    <p:sldId id="262" r:id="rId8"/>
   </p:sldIdLst>
   <p:sldSz cx="12192000" cy="6858000"/>
   <p:notesSz cx="6858000" cy="9144000"/>
@@ -155,10 +160,9 @@
           </a:lstStyle>
           <a:p>
             <a:r>
-              <a:rPr lang="en-US" smtClean="0"/>
+              <a:rPr lang="en-US"/>
               <a:t>Click to edit Master title style</a:t>
             </a:r>
-            <a:endParaRPr lang="en-US"/>
           </a:p>
         </p:txBody>
       </p:sp>
@@ -220,10 +224,9 @@
           </a:lstStyle>
           <a:p>
             <a:r>
-              <a:rPr lang="en-US" smtClean="0"/>
+              <a:rPr lang="en-US"/>
               <a:t>Click to edit Master subtitle style</a:t>
             </a:r>
-            <a:endParaRPr lang="en-US"/>
           </a:p>
         </p:txBody>
       </p:sp>
@@ -244,7 +247,7 @@
           <a:p>
             <a:fld id="{95D9F62C-1626-43A9-89C3-2FF5F85B9216}" type="datetimeFigureOut">
               <a:rPr lang="en-US" smtClean="0"/>
-              <a:t>4/6/2018</a:t>
+              <a:t>7/23/2018</a:t>
             </a:fld>
             <a:endParaRPr lang="en-US"/>
           </a:p>
@@ -338,10 +341,9 @@
           <a:lstStyle/>
           <a:p>
             <a:r>
-              <a:rPr lang="en-US" smtClean="0"/>
+              <a:rPr lang="en-US"/>
               <a:t>Click to edit Master title style</a:t>
             </a:r>
-            <a:endParaRPr lang="en-US"/>
           </a:p>
         </p:txBody>
       </p:sp>
@@ -362,38 +364,37 @@
           <a:p>
             <a:pPr lvl="0"/>
             <a:r>
-              <a:rPr lang="en-US" smtClean="0"/>
+              <a:rPr lang="en-US"/>
               <a:t>Click to edit Master text styles</a:t>
             </a:r>
           </a:p>
           <a:p>
             <a:pPr lvl="1"/>
             <a:r>
-              <a:rPr lang="en-US" smtClean="0"/>
+              <a:rPr lang="en-US"/>
               <a:t>Second level</a:t>
             </a:r>
           </a:p>
           <a:p>
             <a:pPr lvl="2"/>
             <a:r>
-              <a:rPr lang="en-US" smtClean="0"/>
+              <a:rPr lang="en-US"/>
               <a:t>Third level</a:t>
             </a:r>
           </a:p>
           <a:p>
             <a:pPr lvl="3"/>
             <a:r>
-              <a:rPr lang="en-US" smtClean="0"/>
+              <a:rPr lang="en-US"/>
               <a:t>Fourth level</a:t>
             </a:r>
           </a:p>
           <a:p>
             <a:pPr lvl="4"/>
             <a:r>
-              <a:rPr lang="en-US" smtClean="0"/>
+              <a:rPr lang="en-US"/>
               <a:t>Fifth level</a:t>
             </a:r>
-            <a:endParaRPr lang="en-US"/>
           </a:p>
         </p:txBody>
       </p:sp>
@@ -414,7 +415,7 @@
           <a:p>
             <a:fld id="{95D9F62C-1626-43A9-89C3-2FF5F85B9216}" type="datetimeFigureOut">
               <a:rPr lang="en-US" smtClean="0"/>
-              <a:t>4/6/2018</a:t>
+              <a:t>7/23/2018</a:t>
             </a:fld>
             <a:endParaRPr lang="en-US"/>
           </a:p>
@@ -513,10 +514,9 @@
           <a:lstStyle/>
           <a:p>
             <a:r>
-              <a:rPr lang="en-US" smtClean="0"/>
+              <a:rPr lang="en-US"/>
               <a:t>Click to edit Master title style</a:t>
             </a:r>
-            <a:endParaRPr lang="en-US"/>
           </a:p>
         </p:txBody>
       </p:sp>
@@ -542,38 +542,37 @@
           <a:p>
             <a:pPr lvl="0"/>
             <a:r>
-              <a:rPr lang="en-US" smtClean="0"/>
+              <a:rPr lang="en-US"/>
               <a:t>Click to edit Master text styles</a:t>
             </a:r>
           </a:p>
           <a:p>
             <a:pPr lvl="1"/>
             <a:r>
-              <a:rPr lang="en-US" smtClean="0"/>
+              <a:rPr lang="en-US"/>
               <a:t>Second level</a:t>
             </a:r>
           </a:p>
           <a:p>
             <a:pPr lvl="2"/>
             <a:r>
-              <a:rPr lang="en-US" smtClean="0"/>
+              <a:rPr lang="en-US"/>
               <a:t>Third level</a:t>
             </a:r>
           </a:p>
           <a:p>
             <a:pPr lvl="3"/>
             <a:r>
-              <a:rPr lang="en-US" smtClean="0"/>
+              <a:rPr lang="en-US"/>
               <a:t>Fourth level</a:t>
             </a:r>
           </a:p>
           <a:p>
             <a:pPr lvl="4"/>
             <a:r>
-              <a:rPr lang="en-US" smtClean="0"/>
+              <a:rPr lang="en-US"/>
               <a:t>Fifth level</a:t>
             </a:r>
-            <a:endParaRPr lang="en-US"/>
           </a:p>
         </p:txBody>
       </p:sp>
@@ -594,7 +593,7 @@
           <a:p>
             <a:fld id="{95D9F62C-1626-43A9-89C3-2FF5F85B9216}" type="datetimeFigureOut">
               <a:rPr lang="en-US" smtClean="0"/>
-              <a:t>4/6/2018</a:t>
+              <a:t>7/23/2018</a:t>
             </a:fld>
             <a:endParaRPr lang="en-US"/>
           </a:p>
@@ -688,10 +687,9 @@
           <a:lstStyle/>
           <a:p>
             <a:r>
-              <a:rPr lang="en-US" smtClean="0"/>
+              <a:rPr lang="en-US"/>
               <a:t>Click to edit Master title style</a:t>
             </a:r>
-            <a:endParaRPr lang="en-US"/>
           </a:p>
         </p:txBody>
       </p:sp>
@@ -712,38 +710,37 @@
           <a:p>
             <a:pPr lvl="0"/>
             <a:r>
-              <a:rPr lang="en-US" smtClean="0"/>
+              <a:rPr lang="en-US"/>
               <a:t>Click to edit Master text styles</a:t>
             </a:r>
           </a:p>
           <a:p>
             <a:pPr lvl="1"/>
             <a:r>
-              <a:rPr lang="en-US" smtClean="0"/>
+              <a:rPr lang="en-US"/>
               <a:t>Second level</a:t>
             </a:r>
           </a:p>
           <a:p>
             <a:pPr lvl="2"/>
             <a:r>
-              <a:rPr lang="en-US" smtClean="0"/>
+              <a:rPr lang="en-US"/>
               <a:t>Third level</a:t>
             </a:r>
           </a:p>
           <a:p>
             <a:pPr lvl="3"/>
             <a:r>
-              <a:rPr lang="en-US" smtClean="0"/>
+              <a:rPr lang="en-US"/>
               <a:t>Fourth level</a:t>
             </a:r>
           </a:p>
           <a:p>
             <a:pPr lvl="4"/>
             <a:r>
-              <a:rPr lang="en-US" smtClean="0"/>
+              <a:rPr lang="en-US"/>
               <a:t>Fifth level</a:t>
             </a:r>
-            <a:endParaRPr lang="en-US"/>
           </a:p>
         </p:txBody>
       </p:sp>
@@ -764,7 +761,7 @@
           <a:p>
             <a:fld id="{95D9F62C-1626-43A9-89C3-2FF5F85B9216}" type="datetimeFigureOut">
               <a:rPr lang="en-US" smtClean="0"/>
-              <a:t>4/6/2018</a:t>
+              <a:t>7/23/2018</a:t>
             </a:fld>
             <a:endParaRPr lang="en-US"/>
           </a:p>
@@ -867,10 +864,9 @@
           </a:lstStyle>
           <a:p>
             <a:r>
-              <a:rPr lang="en-US" smtClean="0"/>
+              <a:rPr lang="en-US"/>
               <a:t>Click to edit Master title style</a:t>
             </a:r>
-            <a:endParaRPr lang="en-US"/>
           </a:p>
         </p:txBody>
       </p:sp>
@@ -987,7 +983,7 @@
           <a:p>
             <a:pPr lvl="0"/>
             <a:r>
-              <a:rPr lang="en-US" smtClean="0"/>
+              <a:rPr lang="en-US"/>
               <a:t>Click to edit Master text styles</a:t>
             </a:r>
           </a:p>
@@ -1010,7 +1006,7 @@
           <a:p>
             <a:fld id="{95D9F62C-1626-43A9-89C3-2FF5F85B9216}" type="datetimeFigureOut">
               <a:rPr lang="en-US" smtClean="0"/>
-              <a:t>4/6/2018</a:t>
+              <a:t>7/23/2018</a:t>
             </a:fld>
             <a:endParaRPr lang="en-US"/>
           </a:p>
@@ -1104,10 +1100,9 @@
           <a:lstStyle/>
           <a:p>
             <a:r>
-              <a:rPr lang="en-US" smtClean="0"/>
+              <a:rPr lang="en-US"/>
               <a:t>Click to edit Master title style</a:t>
             </a:r>
-            <a:endParaRPr lang="en-US"/>
           </a:p>
         </p:txBody>
       </p:sp>
@@ -1133,38 +1128,37 @@
           <a:p>
             <a:pPr lvl="0"/>
             <a:r>
-              <a:rPr lang="en-US" smtClean="0"/>
+              <a:rPr lang="en-US"/>
               <a:t>Click to edit Master text styles</a:t>
             </a:r>
           </a:p>
           <a:p>
             <a:pPr lvl="1"/>
             <a:r>
-              <a:rPr lang="en-US" smtClean="0"/>
+              <a:rPr lang="en-US"/>
               <a:t>Second level</a:t>
             </a:r>
           </a:p>
           <a:p>
             <a:pPr lvl="2"/>
             <a:r>
-              <a:rPr lang="en-US" smtClean="0"/>
+              <a:rPr lang="en-US"/>
               <a:t>Third level</a:t>
             </a:r>
           </a:p>
           <a:p>
             <a:pPr lvl="3"/>
             <a:r>
-              <a:rPr lang="en-US" smtClean="0"/>
+              <a:rPr lang="en-US"/>
               <a:t>Fourth level</a:t>
             </a:r>
           </a:p>
           <a:p>
             <a:pPr lvl="4"/>
             <a:r>
-              <a:rPr lang="en-US" smtClean="0"/>
+              <a:rPr lang="en-US"/>
               <a:t>Fifth level</a:t>
             </a:r>
-            <a:endParaRPr lang="en-US"/>
           </a:p>
         </p:txBody>
       </p:sp>
@@ -1190,38 +1184,37 @@
           <a:p>
             <a:pPr lvl="0"/>
             <a:r>
-              <a:rPr lang="en-US" smtClean="0"/>
+              <a:rPr lang="en-US"/>
               <a:t>Click to edit Master text styles</a:t>
             </a:r>
           </a:p>
           <a:p>
             <a:pPr lvl="1"/>
             <a:r>
-              <a:rPr lang="en-US" smtClean="0"/>
+              <a:rPr lang="en-US"/>
               <a:t>Second level</a:t>
             </a:r>
           </a:p>
           <a:p>
             <a:pPr lvl="2"/>
             <a:r>
-              <a:rPr lang="en-US" smtClean="0"/>
+              <a:rPr lang="en-US"/>
               <a:t>Third level</a:t>
             </a:r>
           </a:p>
           <a:p>
             <a:pPr lvl="3"/>
             <a:r>
-              <a:rPr lang="en-US" smtClean="0"/>
+              <a:rPr lang="en-US"/>
               <a:t>Fourth level</a:t>
             </a:r>
           </a:p>
           <a:p>
             <a:pPr lvl="4"/>
             <a:r>
-              <a:rPr lang="en-US" smtClean="0"/>
+              <a:rPr lang="en-US"/>
               <a:t>Fifth level</a:t>
             </a:r>
-            <a:endParaRPr lang="en-US"/>
           </a:p>
         </p:txBody>
       </p:sp>
@@ -1242,7 +1235,7 @@
           <a:p>
             <a:fld id="{95D9F62C-1626-43A9-89C3-2FF5F85B9216}" type="datetimeFigureOut">
               <a:rPr lang="en-US" smtClean="0"/>
-              <a:t>4/6/2018</a:t>
+              <a:t>7/23/2018</a:t>
             </a:fld>
             <a:endParaRPr lang="en-US"/>
           </a:p>
@@ -1341,10 +1334,9 @@
           <a:lstStyle/>
           <a:p>
             <a:r>
-              <a:rPr lang="en-US" smtClean="0"/>
+              <a:rPr lang="en-US"/>
               <a:t>Click to edit Master title style</a:t>
             </a:r>
-            <a:endParaRPr lang="en-US"/>
           </a:p>
         </p:txBody>
       </p:sp>
@@ -1407,7 +1399,7 @@
           <a:p>
             <a:pPr lvl="0"/>
             <a:r>
-              <a:rPr lang="en-US" smtClean="0"/>
+              <a:rPr lang="en-US"/>
               <a:t>Click to edit Master text styles</a:t>
             </a:r>
           </a:p>
@@ -1435,38 +1427,37 @@
           <a:p>
             <a:pPr lvl="0"/>
             <a:r>
-              <a:rPr lang="en-US" smtClean="0"/>
+              <a:rPr lang="en-US"/>
               <a:t>Click to edit Master text styles</a:t>
             </a:r>
           </a:p>
           <a:p>
             <a:pPr lvl="1"/>
             <a:r>
-              <a:rPr lang="en-US" smtClean="0"/>
+              <a:rPr lang="en-US"/>
               <a:t>Second level</a:t>
             </a:r>
           </a:p>
           <a:p>
             <a:pPr lvl="2"/>
             <a:r>
-              <a:rPr lang="en-US" smtClean="0"/>
+              <a:rPr lang="en-US"/>
               <a:t>Third level</a:t>
             </a:r>
           </a:p>
           <a:p>
             <a:pPr lvl="3"/>
             <a:r>
-              <a:rPr lang="en-US" smtClean="0"/>
+              <a:rPr lang="en-US"/>
               <a:t>Fourth level</a:t>
             </a:r>
           </a:p>
           <a:p>
             <a:pPr lvl="4"/>
             <a:r>
-              <a:rPr lang="en-US" smtClean="0"/>
+              <a:rPr lang="en-US"/>
               <a:t>Fifth level</a:t>
             </a:r>
-            <a:endParaRPr lang="en-US"/>
           </a:p>
         </p:txBody>
       </p:sp>
@@ -1529,7 +1520,7 @@
           <a:p>
             <a:pPr lvl="0"/>
             <a:r>
-              <a:rPr lang="en-US" smtClean="0"/>
+              <a:rPr lang="en-US"/>
               <a:t>Click to edit Master text styles</a:t>
             </a:r>
           </a:p>
@@ -1557,38 +1548,37 @@
           <a:p>
             <a:pPr lvl="0"/>
             <a:r>
-              <a:rPr lang="en-US" smtClean="0"/>
+              <a:rPr lang="en-US"/>
               <a:t>Click to edit Master text styles</a:t>
             </a:r>
           </a:p>
           <a:p>
             <a:pPr lvl="1"/>
             <a:r>
-              <a:rPr lang="en-US" smtClean="0"/>
+              <a:rPr lang="en-US"/>
               <a:t>Second level</a:t>
             </a:r>
           </a:p>
           <a:p>
             <a:pPr lvl="2"/>
             <a:r>
-              <a:rPr lang="en-US" smtClean="0"/>
+              <a:rPr lang="en-US"/>
               <a:t>Third level</a:t>
             </a:r>
           </a:p>
           <a:p>
             <a:pPr lvl="3"/>
             <a:r>
-              <a:rPr lang="en-US" smtClean="0"/>
+              <a:rPr lang="en-US"/>
               <a:t>Fourth level</a:t>
             </a:r>
           </a:p>
           <a:p>
             <a:pPr lvl="4"/>
             <a:r>
-              <a:rPr lang="en-US" smtClean="0"/>
+              <a:rPr lang="en-US"/>
               <a:t>Fifth level</a:t>
             </a:r>
-            <a:endParaRPr lang="en-US"/>
           </a:p>
         </p:txBody>
       </p:sp>
@@ -1609,7 +1599,7 @@
           <a:p>
             <a:fld id="{95D9F62C-1626-43A9-89C3-2FF5F85B9216}" type="datetimeFigureOut">
               <a:rPr lang="en-US" smtClean="0"/>
-              <a:t>4/6/2018</a:t>
+              <a:t>7/23/2018</a:t>
             </a:fld>
             <a:endParaRPr lang="en-US"/>
           </a:p>
@@ -1703,10 +1693,9 @@
           <a:lstStyle/>
           <a:p>
             <a:r>
-              <a:rPr lang="en-US" smtClean="0"/>
+              <a:rPr lang="en-US"/>
               <a:t>Click to edit Master title style</a:t>
             </a:r>
-            <a:endParaRPr lang="en-US"/>
           </a:p>
         </p:txBody>
       </p:sp>
@@ -1727,7 +1716,7 @@
           <a:p>
             <a:fld id="{95D9F62C-1626-43A9-89C3-2FF5F85B9216}" type="datetimeFigureOut">
               <a:rPr lang="en-US" smtClean="0"/>
-              <a:t>4/6/2018</a:t>
+              <a:t>7/23/2018</a:t>
             </a:fld>
             <a:endParaRPr lang="en-US"/>
           </a:p>
@@ -1822,7 +1811,7 @@
           <a:p>
             <a:fld id="{95D9F62C-1626-43A9-89C3-2FF5F85B9216}" type="datetimeFigureOut">
               <a:rPr lang="en-US" smtClean="0"/>
-              <a:t>4/6/2018</a:t>
+              <a:t>7/23/2018</a:t>
             </a:fld>
             <a:endParaRPr lang="en-US"/>
           </a:p>
@@ -1925,10 +1914,9 @@
           </a:lstStyle>
           <a:p>
             <a:r>
-              <a:rPr lang="en-US" smtClean="0"/>
+              <a:rPr lang="en-US"/>
               <a:t>Click to edit Master title style</a:t>
             </a:r>
-            <a:endParaRPr lang="en-US"/>
           </a:p>
         </p:txBody>
       </p:sp>
@@ -1982,38 +1970,37 @@
           <a:p>
             <a:pPr lvl="0"/>
             <a:r>
-              <a:rPr lang="en-US" smtClean="0"/>
+              <a:rPr lang="en-US"/>
               <a:t>Click to edit Master text styles</a:t>
             </a:r>
           </a:p>
           <a:p>
             <a:pPr lvl="1"/>
             <a:r>
-              <a:rPr lang="en-US" smtClean="0"/>
+              <a:rPr lang="en-US"/>
               <a:t>Second level</a:t>
             </a:r>
           </a:p>
           <a:p>
             <a:pPr lvl="2"/>
             <a:r>
-              <a:rPr lang="en-US" smtClean="0"/>
+              <a:rPr lang="en-US"/>
               <a:t>Third level</a:t>
             </a:r>
           </a:p>
           <a:p>
             <a:pPr lvl="3"/>
             <a:r>
-              <a:rPr lang="en-US" smtClean="0"/>
+              <a:rPr lang="en-US"/>
               <a:t>Fourth level</a:t>
             </a:r>
           </a:p>
           <a:p>
             <a:pPr lvl="4"/>
             <a:r>
-              <a:rPr lang="en-US" smtClean="0"/>
+              <a:rPr lang="en-US"/>
               <a:t>Fifth level</a:t>
             </a:r>
-            <a:endParaRPr lang="en-US"/>
           </a:p>
         </p:txBody>
       </p:sp>
@@ -2076,7 +2063,7 @@
           <a:p>
             <a:pPr lvl="0"/>
             <a:r>
-              <a:rPr lang="en-US" smtClean="0"/>
+              <a:rPr lang="en-US"/>
               <a:t>Click to edit Master text styles</a:t>
             </a:r>
           </a:p>
@@ -2099,7 +2086,7 @@
           <a:p>
             <a:fld id="{95D9F62C-1626-43A9-89C3-2FF5F85B9216}" type="datetimeFigureOut">
               <a:rPr lang="en-US" smtClean="0"/>
-              <a:t>4/6/2018</a:t>
+              <a:t>7/23/2018</a:t>
             </a:fld>
             <a:endParaRPr lang="en-US"/>
           </a:p>
@@ -2202,10 +2189,9 @@
           </a:lstStyle>
           <a:p>
             <a:r>
-              <a:rPr lang="en-US" smtClean="0"/>
+              <a:rPr lang="en-US"/>
               <a:t>Click to edit Master title style</a:t>
             </a:r>
-            <a:endParaRPr lang="en-US"/>
           </a:p>
         </p:txBody>
       </p:sp>
@@ -2329,7 +2315,7 @@
           <a:p>
             <a:pPr lvl="0"/>
             <a:r>
-              <a:rPr lang="en-US" smtClean="0"/>
+              <a:rPr lang="en-US"/>
               <a:t>Click to edit Master text styles</a:t>
             </a:r>
           </a:p>
@@ -2352,7 +2338,7 @@
           <a:p>
             <a:fld id="{95D9F62C-1626-43A9-89C3-2FF5F85B9216}" type="datetimeFigureOut">
               <a:rPr lang="en-US" smtClean="0"/>
-              <a:t>4/6/2018</a:t>
+              <a:t>7/23/2018</a:t>
             </a:fld>
             <a:endParaRPr lang="en-US"/>
           </a:p>
@@ -2461,10 +2447,9 @@
           <a:lstStyle/>
           <a:p>
             <a:r>
-              <a:rPr lang="en-US" smtClean="0"/>
+              <a:rPr lang="en-US"/>
               <a:t>Click to edit Master title style</a:t>
             </a:r>
-            <a:endParaRPr lang="en-US"/>
           </a:p>
         </p:txBody>
       </p:sp>
@@ -2495,38 +2480,37 @@
           <a:p>
             <a:pPr lvl="0"/>
             <a:r>
-              <a:rPr lang="en-US" smtClean="0"/>
+              <a:rPr lang="en-US"/>
               <a:t>Click to edit Master text styles</a:t>
             </a:r>
           </a:p>
           <a:p>
             <a:pPr lvl="1"/>
             <a:r>
-              <a:rPr lang="en-US" smtClean="0"/>
+              <a:rPr lang="en-US"/>
               <a:t>Second level</a:t>
             </a:r>
           </a:p>
           <a:p>
             <a:pPr lvl="2"/>
             <a:r>
-              <a:rPr lang="en-US" smtClean="0"/>
+              <a:rPr lang="en-US"/>
               <a:t>Third level</a:t>
             </a:r>
           </a:p>
           <a:p>
             <a:pPr lvl="3"/>
             <a:r>
-              <a:rPr lang="en-US" smtClean="0"/>
+              <a:rPr lang="en-US"/>
               <a:t>Fourth level</a:t>
             </a:r>
           </a:p>
           <a:p>
             <a:pPr lvl="4"/>
             <a:r>
-              <a:rPr lang="en-US" smtClean="0"/>
+              <a:rPr lang="en-US"/>
               <a:t>Fifth level</a:t>
             </a:r>
-            <a:endParaRPr lang="en-US"/>
           </a:p>
         </p:txBody>
       </p:sp>
@@ -2565,7 +2549,7 @@
           <a:p>
             <a:fld id="{95D9F62C-1626-43A9-89C3-2FF5F85B9216}" type="datetimeFigureOut">
               <a:rPr lang="en-US" smtClean="0"/>
-              <a:t>4/6/2018</a:t>
+              <a:t>7/23/2018</a:t>
             </a:fld>
             <a:endParaRPr lang="en-US"/>
           </a:p>
@@ -2984,10 +2968,25 @@
           <a:prstGeom prst="rect">
             <a:avLst/>
           </a:prstGeom>
+          <a:solidFill>
+            <a:schemeClr val="accent1"/>
+          </a:solidFill>
+          <a:ln w="12700" cap="flat" cmpd="sng" algn="ctr">
+            <a:solidFill>
+              <a:srgbClr val="41719C"/>
+            </a:solidFill>
+            <a:prstDash val="solid"/>
+            <a:miter lim="800000"/>
+            <a:headEnd type="none" w="med" len="med"/>
+            <a:tailEnd type="none" w="med" len="med"/>
+          </a:ln>
           <a:scene3d>
-            <a:camera prst="perspectiveContrastingLeftFacing"/>
+            <a:camera prst="perspectiveContrastingLeftFacing" fov="5100000">
+              <a:rot lat="3000000" lon="2636332" rev="15000000"/>
+            </a:camera>
             <a:lightRig rig="threePt" dir="t"/>
           </a:scene3d>
+          <a:sp3d z="-698500"/>
         </p:spPr>
         <p:style>
           <a:lnRef idx="2">
@@ -3006,11 +3005,15 @@
           </a:fontRef>
         </p:style>
         <p:txBody>
-          <a:bodyPr rtlCol="0" anchor="ctr"/>
+          <a:bodyPr rtlCol="0" anchor="ctr">
+            <a:flatTx/>
+          </a:bodyPr>
           <a:lstStyle/>
           <a:p>
             <a:pPr algn="ctr"/>
-            <a:endParaRPr lang="en-US"/>
+            <a:endParaRPr lang="en-US">
+              <a:latin typeface="Calibri" panose="020F0502020204030204" pitchFamily="34" charset="0"/>
+            </a:endParaRPr>
           </a:p>
         </p:txBody>
       </p:sp>
@@ -3064,13 +3067,6 @@
   <p:clrMapOvr>
     <a:masterClrMapping/>
   </p:clrMapOvr>
-  <p:timing>
-    <p:tnLst>
-      <p:par>
-        <p:cTn id="1" dur="indefinite" restart="never" nodeType="tmRoot"/>
-      </p:par>
-    </p:tnLst>
-  </p:timing>
 </p:sld>
 </file>
 
@@ -3105,8 +3101,73 @@
           <a:prstGeom prst="rect">
             <a:avLst/>
           </a:prstGeom>
+          <a:solidFill>
+            <a:schemeClr val="accent1"/>
+          </a:solidFill>
+          <a:ln w="12700" cap="flat" cmpd="sng" algn="ctr">
+            <a:solidFill>
+              <a:srgbClr val="41719C"/>
+            </a:solidFill>
+            <a:prstDash val="solid"/>
+            <a:miter lim="800000"/>
+            <a:headEnd type="none" w="med" len="med"/>
+            <a:tailEnd type="none" w="med" len="med"/>
+          </a:ln>
           <a:scene3d>
-            <a:camera prst="perspectiveContrastingLeftFacing"/>
+            <a:camera prst="perspectiveContrastingLeftFacing" fov="5100000">
+              <a:rot lat="3000000" lon="2636332" rev="15000000"/>
+            </a:camera>
+            <a:lightRig rig="threePt" dir="t"/>
+          </a:scene3d>
+          <a:sp3d z="-698500"/>
+        </p:spPr>
+        <p:style>
+          <a:lnRef idx="2">
+            <a:schemeClr val="accent1">
+              <a:shade val="50000"/>
+            </a:schemeClr>
+          </a:lnRef>
+          <a:fillRef idx="1">
+            <a:schemeClr val="accent1"/>
+          </a:fillRef>
+          <a:effectRef idx="0">
+            <a:schemeClr val="accent1"/>
+          </a:effectRef>
+          <a:fontRef idx="minor">
+            <a:schemeClr val="lt1"/>
+          </a:fontRef>
+        </p:style>
+        <p:txBody>
+          <a:bodyPr rtlCol="0" anchor="ctr">
+            <a:flatTx/>
+          </a:bodyPr>
+          <a:lstStyle/>
+          <a:p>
+            <a:pPr algn="ctr"/>
+            <a:endParaRPr lang="en-US">
+              <a:latin typeface="Calibri" panose="020F0502020204030204" pitchFamily="34" charset="0"/>
+            </a:endParaRPr>
+          </a:p>
+        </p:txBody>
+      </p:sp>
+      <p:sp>
+        <p:nvSpPr>
+          <p:cNvPr id="5" name="Destination"/>
+          <p:cNvSpPr/>
+          <p:nvPr/>
+        </p:nvSpPr>
+        <p:spPr>
+          <a:xfrm>
+            <a:off x="7356764" y="2008909"/>
+            <a:ext cx="2549236" cy="2660073"/>
+          </a:xfrm>
+          <a:prstGeom prst="triangle">
+            <a:avLst/>
+          </a:prstGeom>
+          <a:scene3d>
+            <a:camera prst="orthographicFront">
+              <a:rot lat="0" lon="2636332" rev="0"/>
+            </a:camera>
             <a:lightRig rig="threePt" dir="t"/>
           </a:scene3d>
         </p:spPr>
@@ -3135,6 +3196,99 @@
           </a:p>
         </p:txBody>
       </p:sp>
+    </p:spTree>
+    <p:extLst>
+      <p:ext uri="{BB962C8B-B14F-4D97-AF65-F5344CB8AC3E}">
+        <p14:creationId xmlns:p14="http://schemas.microsoft.com/office/powerpoint/2010/main" val="3456016998"/>
+      </p:ext>
+    </p:extLst>
+  </p:cSld>
+  <p:clrMapOvr>
+    <a:masterClrMapping/>
+  </p:clrMapOvr>
+</p:sld>
+</file>
+
+<file path=ppt/slides/slide3.xml><?xml version="1.0" encoding="utf-8"?>
+<p:sld xmlns:a="http://schemas.openxmlformats.org/drawingml/2006/main" xmlns:r="http://schemas.openxmlformats.org/officeDocument/2006/relationships" xmlns:p="http://schemas.openxmlformats.org/presentationml/2006/main">
+  <p:cSld>
+    <p:spTree>
+      <p:nvGrpSpPr>
+        <p:cNvPr id="1" name=""/>
+        <p:cNvGrpSpPr/>
+        <p:nvPr/>
+      </p:nvGrpSpPr>
+      <p:grpSpPr>
+        <a:xfrm>
+          <a:off x="0" y="0"/>
+          <a:ext cx="0" cy="0"/>
+          <a:chOff x="0" y="0"/>
+          <a:chExt cx="0" cy="0"/>
+        </a:xfrm>
+      </p:grpSpPr>
+      <p:sp>
+        <p:nvSpPr>
+          <p:cNvPr id="4" name="Source"/>
+          <p:cNvSpPr/>
+          <p:nvPr/>
+        </p:nvSpPr>
+        <p:spPr>
+          <a:xfrm>
+            <a:off x="1177636" y="831272"/>
+            <a:ext cx="4572000" cy="3588327"/>
+          </a:xfrm>
+          <a:prstGeom prst="rect">
+            <a:avLst/>
+          </a:prstGeom>
+          <a:solidFill>
+            <a:schemeClr val="accent1"/>
+          </a:solidFill>
+          <a:ln w="12700" cap="flat" cmpd="sng" algn="ctr">
+            <a:solidFill>
+              <a:srgbClr val="41719C"/>
+            </a:solidFill>
+            <a:prstDash val="solid"/>
+            <a:miter lim="800000"/>
+            <a:headEnd type="none" w="med" len="med"/>
+            <a:tailEnd type="none" w="med" len="med"/>
+          </a:ln>
+          <a:scene3d>
+            <a:camera prst="perspectiveContrastingLeftFacing" fov="5100000">
+              <a:rot lat="3000000" lon="2636332" rev="15000000"/>
+            </a:camera>
+            <a:lightRig rig="threePt" dir="t"/>
+          </a:scene3d>
+          <a:sp3d z="-698500"/>
+        </p:spPr>
+        <p:style>
+          <a:lnRef idx="2">
+            <a:schemeClr val="accent1">
+              <a:shade val="50000"/>
+            </a:schemeClr>
+          </a:lnRef>
+          <a:fillRef idx="1">
+            <a:schemeClr val="accent1"/>
+          </a:fillRef>
+          <a:effectRef idx="0">
+            <a:schemeClr val="accent1"/>
+          </a:effectRef>
+          <a:fontRef idx="minor">
+            <a:schemeClr val="lt1"/>
+          </a:fontRef>
+        </p:style>
+        <p:txBody>
+          <a:bodyPr rtlCol="0" anchor="ctr">
+            <a:flatTx/>
+          </a:bodyPr>
+          <a:lstStyle/>
+          <a:p>
+            <a:pPr algn="ctr"/>
+            <a:endParaRPr lang="en-US">
+              <a:latin typeface="Calibri" panose="020F0502020204030204" pitchFamily="34" charset="0"/>
+            </a:endParaRPr>
+          </a:p>
+        </p:txBody>
+      </p:sp>
       <p:sp>
         <p:nvSpPr>
           <p:cNvPr id="5" name="Destination"/>
@@ -3150,9 +3304,424 @@
             <a:avLst/>
           </a:prstGeom>
           <a:scene3d>
-            <a:camera prst="perspectiveContrastingLeftFacing" fov="2700000">
-              <a:rot lat="623785" lon="2636332" rev="21386789"/>
+            <a:camera prst="orthographicFront">
+              <a:rot lat="3000000" lon="0" rev="0"/>
             </a:camera>
+            <a:lightRig rig="threePt" dir="t"/>
+          </a:scene3d>
+        </p:spPr>
+        <p:style>
+          <a:lnRef idx="2">
+            <a:schemeClr val="accent1">
+              <a:shade val="50000"/>
+            </a:schemeClr>
+          </a:lnRef>
+          <a:fillRef idx="1">
+            <a:schemeClr val="accent1"/>
+          </a:fillRef>
+          <a:effectRef idx="0">
+            <a:schemeClr val="accent1"/>
+          </a:effectRef>
+          <a:fontRef idx="minor">
+            <a:schemeClr val="lt1"/>
+          </a:fontRef>
+        </p:style>
+        <p:txBody>
+          <a:bodyPr rtlCol="0" anchor="ctr"/>
+          <a:lstStyle/>
+          <a:p>
+            <a:pPr algn="ctr"/>
+            <a:endParaRPr lang="en-US"/>
+          </a:p>
+        </p:txBody>
+      </p:sp>
+    </p:spTree>
+    <p:extLst>
+      <p:ext uri="{BB962C8B-B14F-4D97-AF65-F5344CB8AC3E}">
+        <p14:creationId xmlns:p14="http://schemas.microsoft.com/office/powerpoint/2010/main" val="3869620806"/>
+      </p:ext>
+    </p:extLst>
+  </p:cSld>
+  <p:clrMapOvr>
+    <a:masterClrMapping/>
+  </p:clrMapOvr>
+</p:sld>
+</file>
+
+<file path=ppt/slides/slide4.xml><?xml version="1.0" encoding="utf-8"?>
+<p:sld xmlns:a="http://schemas.openxmlformats.org/drawingml/2006/main" xmlns:r="http://schemas.openxmlformats.org/officeDocument/2006/relationships" xmlns:p="http://schemas.openxmlformats.org/presentationml/2006/main">
+  <p:cSld>
+    <p:spTree>
+      <p:nvGrpSpPr>
+        <p:cNvPr id="1" name=""/>
+        <p:cNvGrpSpPr/>
+        <p:nvPr/>
+      </p:nvGrpSpPr>
+      <p:grpSpPr>
+        <a:xfrm>
+          <a:off x="0" y="0"/>
+          <a:ext cx="0" cy="0"/>
+          <a:chOff x="0" y="0"/>
+          <a:chExt cx="0" cy="0"/>
+        </a:xfrm>
+      </p:grpSpPr>
+      <p:sp>
+        <p:nvSpPr>
+          <p:cNvPr id="4" name="Source"/>
+          <p:cNvSpPr/>
+          <p:nvPr/>
+        </p:nvSpPr>
+        <p:spPr>
+          <a:xfrm>
+            <a:off x="1177636" y="831272"/>
+            <a:ext cx="4572000" cy="3588327"/>
+          </a:xfrm>
+          <a:prstGeom prst="rect">
+            <a:avLst/>
+          </a:prstGeom>
+          <a:solidFill>
+            <a:schemeClr val="accent1"/>
+          </a:solidFill>
+          <a:ln w="12700" cap="flat" cmpd="sng" algn="ctr">
+            <a:solidFill>
+              <a:srgbClr val="41719C"/>
+            </a:solidFill>
+            <a:prstDash val="solid"/>
+            <a:miter lim="800000"/>
+            <a:headEnd type="none" w="med" len="med"/>
+            <a:tailEnd type="none" w="med" len="med"/>
+          </a:ln>
+          <a:scene3d>
+            <a:camera prst="perspectiveContrastingLeftFacing" fov="5100000">
+              <a:rot lat="3000000" lon="2636332" rev="15000000"/>
+            </a:camera>
+            <a:lightRig rig="threePt" dir="t"/>
+          </a:scene3d>
+          <a:sp3d z="-698500"/>
+        </p:spPr>
+        <p:style>
+          <a:lnRef idx="2">
+            <a:schemeClr val="accent1">
+              <a:shade val="50000"/>
+            </a:schemeClr>
+          </a:lnRef>
+          <a:fillRef idx="1">
+            <a:schemeClr val="accent1"/>
+          </a:fillRef>
+          <a:effectRef idx="0">
+            <a:schemeClr val="accent1"/>
+          </a:effectRef>
+          <a:fontRef idx="minor">
+            <a:schemeClr val="lt1"/>
+          </a:fontRef>
+        </p:style>
+        <p:txBody>
+          <a:bodyPr rtlCol="0" anchor="ctr">
+            <a:flatTx/>
+          </a:bodyPr>
+          <a:lstStyle/>
+          <a:p>
+            <a:pPr algn="ctr"/>
+            <a:endParaRPr lang="en-US">
+              <a:latin typeface="Calibri" panose="020F0502020204030204" pitchFamily="34" charset="0"/>
+            </a:endParaRPr>
+          </a:p>
+        </p:txBody>
+      </p:sp>
+      <p:sp>
+        <p:nvSpPr>
+          <p:cNvPr id="5" name="Destination"/>
+          <p:cNvSpPr/>
+          <p:nvPr/>
+        </p:nvSpPr>
+        <p:spPr>
+          <a:xfrm>
+            <a:off x="7356764" y="2008909"/>
+            <a:ext cx="2549236" cy="2660073"/>
+          </a:xfrm>
+          <a:prstGeom prst="triangle">
+            <a:avLst/>
+          </a:prstGeom>
+          <a:scene3d>
+            <a:camera prst="orthographicFront">
+              <a:rot lat="0" lon="0" rev="15000000"/>
+            </a:camera>
+            <a:lightRig rig="threePt" dir="t"/>
+          </a:scene3d>
+        </p:spPr>
+        <p:style>
+          <a:lnRef idx="2">
+            <a:schemeClr val="accent1">
+              <a:shade val="50000"/>
+            </a:schemeClr>
+          </a:lnRef>
+          <a:fillRef idx="1">
+            <a:schemeClr val="accent1"/>
+          </a:fillRef>
+          <a:effectRef idx="0">
+            <a:schemeClr val="accent1"/>
+          </a:effectRef>
+          <a:fontRef idx="minor">
+            <a:schemeClr val="lt1"/>
+          </a:fontRef>
+        </p:style>
+        <p:txBody>
+          <a:bodyPr rtlCol="0" anchor="ctr"/>
+          <a:lstStyle/>
+          <a:p>
+            <a:pPr algn="ctr"/>
+            <a:endParaRPr lang="en-US"/>
+          </a:p>
+        </p:txBody>
+      </p:sp>
+    </p:spTree>
+    <p:extLst>
+      <p:ext uri="{BB962C8B-B14F-4D97-AF65-F5344CB8AC3E}">
+        <p14:creationId xmlns:p14="http://schemas.microsoft.com/office/powerpoint/2010/main" val="1884704642"/>
+      </p:ext>
+    </p:extLst>
+  </p:cSld>
+  <p:clrMapOvr>
+    <a:masterClrMapping/>
+  </p:clrMapOvr>
+</p:sld>
+</file>
+
+<file path=ppt/slides/slide5.xml><?xml version="1.0" encoding="utf-8"?>
+<p:sld xmlns:a="http://schemas.openxmlformats.org/drawingml/2006/main" xmlns:r="http://schemas.openxmlformats.org/officeDocument/2006/relationships" xmlns:p="http://schemas.openxmlformats.org/presentationml/2006/main">
+  <p:cSld>
+    <p:spTree>
+      <p:nvGrpSpPr>
+        <p:cNvPr id="1" name=""/>
+        <p:cNvGrpSpPr/>
+        <p:nvPr/>
+      </p:nvGrpSpPr>
+      <p:grpSpPr>
+        <a:xfrm>
+          <a:off x="0" y="0"/>
+          <a:ext cx="0" cy="0"/>
+          <a:chOff x="0" y="0"/>
+          <a:chExt cx="0" cy="0"/>
+        </a:xfrm>
+      </p:grpSpPr>
+      <p:sp>
+        <p:nvSpPr>
+          <p:cNvPr id="4" name="Source"/>
+          <p:cNvSpPr/>
+          <p:nvPr/>
+        </p:nvSpPr>
+        <p:spPr>
+          <a:xfrm>
+            <a:off x="1177636" y="831272"/>
+            <a:ext cx="4572000" cy="3588327"/>
+          </a:xfrm>
+          <a:prstGeom prst="rect">
+            <a:avLst/>
+          </a:prstGeom>
+          <a:solidFill>
+            <a:schemeClr val="accent1"/>
+          </a:solidFill>
+          <a:ln w="12700" cap="flat" cmpd="sng" algn="ctr">
+            <a:solidFill>
+              <a:srgbClr val="41719C"/>
+            </a:solidFill>
+            <a:prstDash val="solid"/>
+            <a:miter lim="800000"/>
+            <a:headEnd type="none" w="med" len="med"/>
+            <a:tailEnd type="none" w="med" len="med"/>
+          </a:ln>
+          <a:scene3d>
+            <a:camera prst="perspectiveContrastingLeftFacing" fov="5100000">
+              <a:rot lat="3000000" lon="2636332" rev="15000000"/>
+            </a:camera>
+            <a:lightRig rig="threePt" dir="t"/>
+          </a:scene3d>
+          <a:sp3d z="-698500"/>
+        </p:spPr>
+        <p:style>
+          <a:lnRef idx="2">
+            <a:schemeClr val="accent1">
+              <a:shade val="50000"/>
+            </a:schemeClr>
+          </a:lnRef>
+          <a:fillRef idx="1">
+            <a:schemeClr val="accent1"/>
+          </a:fillRef>
+          <a:effectRef idx="0">
+            <a:schemeClr val="accent1"/>
+          </a:effectRef>
+          <a:fontRef idx="minor">
+            <a:schemeClr val="lt1"/>
+          </a:fontRef>
+        </p:style>
+        <p:txBody>
+          <a:bodyPr rtlCol="0" anchor="ctr">
+            <a:flatTx/>
+          </a:bodyPr>
+          <a:lstStyle/>
+          <a:p>
+            <a:pPr algn="ctr"/>
+            <a:endParaRPr lang="en-US">
+              <a:latin typeface="Calibri" panose="020F0502020204030204" pitchFamily="34" charset="0"/>
+            </a:endParaRPr>
+          </a:p>
+        </p:txBody>
+      </p:sp>
+      <p:sp>
+        <p:nvSpPr>
+          <p:cNvPr id="5" name="Destination"/>
+          <p:cNvSpPr/>
+          <p:nvPr/>
+        </p:nvSpPr>
+        <p:spPr>
+          <a:xfrm>
+            <a:off x="7356764" y="2008909"/>
+            <a:ext cx="2549236" cy="2660073"/>
+          </a:xfrm>
+          <a:prstGeom prst="triangle">
+            <a:avLst/>
+          </a:prstGeom>
+          <a:scene3d>
+            <a:camera prst="legacyPerspectiveFront">
+              <a:rot lat="0" lon="0" rev="0"/>
+            </a:camera>
+            <a:lightRig rig="threePt" dir="t"/>
+          </a:scene3d>
+        </p:spPr>
+        <p:style>
+          <a:lnRef idx="2">
+            <a:schemeClr val="accent1">
+              <a:shade val="50000"/>
+            </a:schemeClr>
+          </a:lnRef>
+          <a:fillRef idx="1">
+            <a:schemeClr val="accent1"/>
+          </a:fillRef>
+          <a:effectRef idx="0">
+            <a:schemeClr val="accent1"/>
+          </a:effectRef>
+          <a:fontRef idx="minor">
+            <a:schemeClr val="lt1"/>
+          </a:fontRef>
+        </p:style>
+        <p:txBody>
+          <a:bodyPr rtlCol="0" anchor="ctr"/>
+          <a:lstStyle/>
+          <a:p>
+            <a:pPr algn="ctr"/>
+            <a:endParaRPr lang="en-US"/>
+          </a:p>
+        </p:txBody>
+      </p:sp>
+    </p:spTree>
+    <p:extLst>
+      <p:ext uri="{BB962C8B-B14F-4D97-AF65-F5344CB8AC3E}">
+        <p14:creationId xmlns:p14="http://schemas.microsoft.com/office/powerpoint/2010/main" val="3689130061"/>
+      </p:ext>
+    </p:extLst>
+  </p:cSld>
+  <p:clrMapOvr>
+    <a:masterClrMapping/>
+  </p:clrMapOvr>
+</p:sld>
+</file>
+
+<file path=ppt/slides/slide6.xml><?xml version="1.0" encoding="utf-8"?>
+<p:sld xmlns:a="http://schemas.openxmlformats.org/drawingml/2006/main" xmlns:r="http://schemas.openxmlformats.org/officeDocument/2006/relationships" xmlns:p="http://schemas.openxmlformats.org/presentationml/2006/main">
+  <p:cSld>
+    <p:spTree>
+      <p:nvGrpSpPr>
+        <p:cNvPr id="1" name=""/>
+        <p:cNvGrpSpPr/>
+        <p:nvPr/>
+      </p:nvGrpSpPr>
+      <p:grpSpPr>
+        <a:xfrm>
+          <a:off x="0" y="0"/>
+          <a:ext cx="0" cy="0"/>
+          <a:chOff x="0" y="0"/>
+          <a:chExt cx="0" cy="0"/>
+        </a:xfrm>
+      </p:grpSpPr>
+      <p:sp>
+        <p:nvSpPr>
+          <p:cNvPr id="4" name="Source"/>
+          <p:cNvSpPr/>
+          <p:nvPr/>
+        </p:nvSpPr>
+        <p:spPr>
+          <a:xfrm>
+            <a:off x="1177636" y="831272"/>
+            <a:ext cx="4572000" cy="3588327"/>
+          </a:xfrm>
+          <a:prstGeom prst="rect">
+            <a:avLst/>
+          </a:prstGeom>
+          <a:solidFill>
+            <a:schemeClr val="accent1"/>
+          </a:solidFill>
+          <a:ln w="12700" cap="flat" cmpd="sng" algn="ctr">
+            <a:solidFill>
+              <a:srgbClr val="41719C"/>
+            </a:solidFill>
+            <a:prstDash val="solid"/>
+            <a:miter lim="800000"/>
+            <a:headEnd type="none" w="med" len="med"/>
+            <a:tailEnd type="none" w="med" len="med"/>
+          </a:ln>
+          <a:scene3d>
+            <a:camera prst="perspectiveContrastingLeftFacing" fov="5100000">
+              <a:rot lat="3000000" lon="2636332" rev="15000000"/>
+            </a:camera>
+            <a:lightRig rig="threePt" dir="t"/>
+          </a:scene3d>
+          <a:sp3d z="-698500"/>
+        </p:spPr>
+        <p:style>
+          <a:lnRef idx="2">
+            <a:schemeClr val="accent1">
+              <a:shade val="50000"/>
+            </a:schemeClr>
+          </a:lnRef>
+          <a:fillRef idx="1">
+            <a:schemeClr val="accent1"/>
+          </a:fillRef>
+          <a:effectRef idx="0">
+            <a:schemeClr val="accent1"/>
+          </a:effectRef>
+          <a:fontRef idx="minor">
+            <a:schemeClr val="lt1"/>
+          </a:fontRef>
+        </p:style>
+        <p:txBody>
+          <a:bodyPr rtlCol="0" anchor="ctr">
+            <a:flatTx/>
+          </a:bodyPr>
+          <a:lstStyle/>
+          <a:p>
+            <a:pPr algn="ctr"/>
+            <a:endParaRPr lang="en-US">
+              <a:latin typeface="Calibri" panose="020F0502020204030204" pitchFamily="34" charset="0"/>
+            </a:endParaRPr>
+          </a:p>
+        </p:txBody>
+      </p:sp>
+      <p:sp>
+        <p:nvSpPr>
+          <p:cNvPr id="5" name="Destination"/>
+          <p:cNvSpPr/>
+          <p:nvPr/>
+        </p:nvSpPr>
+        <p:spPr>
+          <a:xfrm>
+            <a:off x="7356764" y="2008909"/>
+            <a:ext cx="2549236" cy="2660073"/>
+          </a:xfrm>
+          <a:prstGeom prst="triangle">
+            <a:avLst/>
+          </a:prstGeom>
+          <a:scene3d>
+            <a:camera prst="orthographicFront"/>
             <a:lightRig rig="threePt" dir="t"/>
           </a:scene3d>
           <a:sp3d/>
@@ -3174,7 +3743,9 @@
           </a:fontRef>
         </p:style>
         <p:txBody>
-          <a:bodyPr rtlCol="0" anchor="ctr"/>
+          <a:bodyPr rtlCol="0" anchor="ctr">
+            <a:flatTx/>
+          </a:bodyPr>
           <a:lstStyle/>
           <a:p>
             <a:pPr algn="ctr"/>
@@ -3185,20 +3756,153 @@
     </p:spTree>
     <p:extLst>
       <p:ext uri="{BB962C8B-B14F-4D97-AF65-F5344CB8AC3E}">
-        <p14:creationId xmlns:p14="http://schemas.microsoft.com/office/powerpoint/2010/main" val="4233431373"/>
+        <p14:creationId xmlns:p14="http://schemas.microsoft.com/office/powerpoint/2010/main" val="3493480151"/>
       </p:ext>
     </p:extLst>
   </p:cSld>
   <p:clrMapOvr>
     <a:masterClrMapping/>
   </p:clrMapOvr>
-  <p:timing>
-    <p:tnLst>
-      <p:par>
-        <p:cTn id="1" dur="indefinite" restart="never" nodeType="tmRoot"/>
-      </p:par>
-    </p:tnLst>
-  </p:timing>
+</p:sld>
+</file>
+
+<file path=ppt/slides/slide7.xml><?xml version="1.0" encoding="utf-8"?>
+<p:sld xmlns:a="http://schemas.openxmlformats.org/drawingml/2006/main" xmlns:r="http://schemas.openxmlformats.org/officeDocument/2006/relationships" xmlns:p="http://schemas.openxmlformats.org/presentationml/2006/main">
+  <p:cSld>
+    <p:spTree>
+      <p:nvGrpSpPr>
+        <p:cNvPr id="1" name=""/>
+        <p:cNvGrpSpPr/>
+        <p:nvPr/>
+      </p:nvGrpSpPr>
+      <p:grpSpPr>
+        <a:xfrm>
+          <a:off x="0" y="0"/>
+          <a:ext cx="0" cy="0"/>
+          <a:chOff x="0" y="0"/>
+          <a:chExt cx="0" cy="0"/>
+        </a:xfrm>
+      </p:grpSpPr>
+      <p:sp>
+        <p:nvSpPr>
+          <p:cNvPr id="4" name="Source"/>
+          <p:cNvSpPr/>
+          <p:nvPr/>
+        </p:nvSpPr>
+        <p:spPr>
+          <a:xfrm>
+            <a:off x="1177636" y="831272"/>
+            <a:ext cx="4572000" cy="3588327"/>
+          </a:xfrm>
+          <a:prstGeom prst="rect">
+            <a:avLst/>
+          </a:prstGeom>
+          <a:solidFill>
+            <a:schemeClr val="accent1"/>
+          </a:solidFill>
+          <a:ln w="12700" cap="flat" cmpd="sng" algn="ctr">
+            <a:solidFill>
+              <a:srgbClr val="41719C"/>
+            </a:solidFill>
+            <a:prstDash val="solid"/>
+            <a:miter lim="800000"/>
+            <a:headEnd type="none" w="med" len="med"/>
+            <a:tailEnd type="none" w="med" len="med"/>
+          </a:ln>
+          <a:scene3d>
+            <a:camera prst="perspectiveContrastingLeftFacing" fov="5100000">
+              <a:rot lat="3000000" lon="2636332" rev="15000000"/>
+            </a:camera>
+            <a:lightRig rig="threePt" dir="t"/>
+          </a:scene3d>
+          <a:sp3d z="-698500"/>
+        </p:spPr>
+        <p:style>
+          <a:lnRef idx="2">
+            <a:schemeClr val="accent1">
+              <a:shade val="50000"/>
+            </a:schemeClr>
+          </a:lnRef>
+          <a:fillRef idx="1">
+            <a:schemeClr val="accent1"/>
+          </a:fillRef>
+          <a:effectRef idx="0">
+            <a:schemeClr val="accent1"/>
+          </a:effectRef>
+          <a:fontRef idx="minor">
+            <a:schemeClr val="lt1"/>
+          </a:fontRef>
+        </p:style>
+        <p:txBody>
+          <a:bodyPr rtlCol="0" anchor="ctr">
+            <a:flatTx/>
+          </a:bodyPr>
+          <a:lstStyle/>
+          <a:p>
+            <a:pPr algn="ctr"/>
+            <a:endParaRPr lang="en-US">
+              <a:latin typeface="Calibri" panose="020F0502020204030204" pitchFamily="34" charset="0"/>
+            </a:endParaRPr>
+          </a:p>
+        </p:txBody>
+      </p:sp>
+      <p:sp>
+        <p:nvSpPr>
+          <p:cNvPr id="5" name="Destination"/>
+          <p:cNvSpPr/>
+          <p:nvPr/>
+        </p:nvSpPr>
+        <p:spPr>
+          <a:xfrm>
+            <a:off x="7356764" y="2008909"/>
+            <a:ext cx="2549236" cy="2660073"/>
+          </a:xfrm>
+          <a:prstGeom prst="triangle">
+            <a:avLst/>
+          </a:prstGeom>
+          <a:scene3d>
+            <a:camera prst="orthographicFront"/>
+            <a:lightRig rig="threePt" dir="t"/>
+          </a:scene3d>
+          <a:sp3d z="-698500"/>
+        </p:spPr>
+        <p:style>
+          <a:lnRef idx="2">
+            <a:schemeClr val="accent1">
+              <a:shade val="50000"/>
+            </a:schemeClr>
+          </a:lnRef>
+          <a:fillRef idx="1">
+            <a:schemeClr val="accent1"/>
+          </a:fillRef>
+          <a:effectRef idx="0">
+            <a:schemeClr val="accent1"/>
+          </a:effectRef>
+          <a:fontRef idx="minor">
+            <a:schemeClr val="lt1"/>
+          </a:fontRef>
+        </p:style>
+        <p:txBody>
+          <a:bodyPr rtlCol="0" anchor="ctr">
+            <a:flatTx/>
+          </a:bodyPr>
+          <a:lstStyle/>
+          <a:p>
+            <a:pPr algn="ctr"/>
+            <a:endParaRPr lang="en-US"/>
+          </a:p>
+        </p:txBody>
+      </p:sp>
+    </p:spTree>
+    <p:extLst>
+      <p:ext uri="{BB962C8B-B14F-4D97-AF65-F5344CB8AC3E}">
+        <p14:creationId xmlns:p14="http://schemas.microsoft.com/office/powerpoint/2010/main" val="2506731962"/>
+      </p:ext>
+    </p:extLst>
+  </p:cSld>
+  <p:clrMapOvr>
+    <a:masterClrMapping/>
+  </p:clrMapOvr>
 </p:sld>
 </file>
 

</xml_diff>